<commit_message>
debut SEO dans le code
</commit_message>
<xml_diff>
--- a/chouette agence.pptx
+++ b/chouette agence.pptx
@@ -9,8 +9,9 @@
     <p:sldId id="257" r:id="rId3"/>
     <p:sldId id="258" r:id="rId4"/>
     <p:sldId id="261" r:id="rId5"/>
-    <p:sldId id="259" r:id="rId6"/>
-    <p:sldId id="260" r:id="rId7"/>
+    <p:sldId id="262" r:id="rId6"/>
+    <p:sldId id="259" r:id="rId7"/>
+    <p:sldId id="260" r:id="rId8"/>
   </p:sldIdLst>
   <p:sldSz cx="12192000" cy="6858000"/>
   <p:notesSz cx="6858000" cy="9144000"/>
@@ -109,6 +110,11 @@
       </a:defRPr>
     </a:lvl9pPr>
   </p:defaultTextStyle>
+  <p:extLst>
+    <p:ext uri="{EFAFB233-063F-42B5-8137-9DF3F51BA10A}">
+      <p15:sldGuideLst xmlns:p15="http://schemas.microsoft.com/office/powerpoint/2012/main"/>
+    </p:ext>
+  </p:extLst>
 </p:presentation>
 </file>
 
@@ -243,7 +249,7 @@
           <a:p>
             <a:fld id="{79049A12-6D64-4FC5-8C45-D8F5AEFED95C}" type="datetimeFigureOut">
               <a:rPr lang="fr-FR" smtClean="0"/>
-              <a:t>22/01/2022</a:t>
+              <a:t>25/01/2022</a:t>
             </a:fld>
             <a:endParaRPr lang="fr-FR"/>
           </a:p>
@@ -413,7 +419,7 @@
           <a:p>
             <a:fld id="{79049A12-6D64-4FC5-8C45-D8F5AEFED95C}" type="datetimeFigureOut">
               <a:rPr lang="fr-FR" smtClean="0"/>
-              <a:t>22/01/2022</a:t>
+              <a:t>25/01/2022</a:t>
             </a:fld>
             <a:endParaRPr lang="fr-FR"/>
           </a:p>
@@ -593,7 +599,7 @@
           <a:p>
             <a:fld id="{79049A12-6D64-4FC5-8C45-D8F5AEFED95C}" type="datetimeFigureOut">
               <a:rPr lang="fr-FR" smtClean="0"/>
-              <a:t>22/01/2022</a:t>
+              <a:t>25/01/2022</a:t>
             </a:fld>
             <a:endParaRPr lang="fr-FR"/>
           </a:p>
@@ -763,7 +769,7 @@
           <a:p>
             <a:fld id="{79049A12-6D64-4FC5-8C45-D8F5AEFED95C}" type="datetimeFigureOut">
               <a:rPr lang="fr-FR" smtClean="0"/>
-              <a:t>22/01/2022</a:t>
+              <a:t>25/01/2022</a:t>
             </a:fld>
             <a:endParaRPr lang="fr-FR"/>
           </a:p>
@@ -1009,7 +1015,7 @@
           <a:p>
             <a:fld id="{79049A12-6D64-4FC5-8C45-D8F5AEFED95C}" type="datetimeFigureOut">
               <a:rPr lang="fr-FR" smtClean="0"/>
-              <a:t>22/01/2022</a:t>
+              <a:t>25/01/2022</a:t>
             </a:fld>
             <a:endParaRPr lang="fr-FR"/>
           </a:p>
@@ -1241,7 +1247,7 @@
           <a:p>
             <a:fld id="{79049A12-6D64-4FC5-8C45-D8F5AEFED95C}" type="datetimeFigureOut">
               <a:rPr lang="fr-FR" smtClean="0"/>
-              <a:t>22/01/2022</a:t>
+              <a:t>25/01/2022</a:t>
             </a:fld>
             <a:endParaRPr lang="fr-FR"/>
           </a:p>
@@ -1608,7 +1614,7 @@
           <a:p>
             <a:fld id="{79049A12-6D64-4FC5-8C45-D8F5AEFED95C}" type="datetimeFigureOut">
               <a:rPr lang="fr-FR" smtClean="0"/>
-              <a:t>22/01/2022</a:t>
+              <a:t>25/01/2022</a:t>
             </a:fld>
             <a:endParaRPr lang="fr-FR"/>
           </a:p>
@@ -1726,7 +1732,7 @@
           <a:p>
             <a:fld id="{79049A12-6D64-4FC5-8C45-D8F5AEFED95C}" type="datetimeFigureOut">
               <a:rPr lang="fr-FR" smtClean="0"/>
-              <a:t>22/01/2022</a:t>
+              <a:t>25/01/2022</a:t>
             </a:fld>
             <a:endParaRPr lang="fr-FR"/>
           </a:p>
@@ -1821,7 +1827,7 @@
           <a:p>
             <a:fld id="{79049A12-6D64-4FC5-8C45-D8F5AEFED95C}" type="datetimeFigureOut">
               <a:rPr lang="fr-FR" smtClean="0"/>
-              <a:t>22/01/2022</a:t>
+              <a:t>25/01/2022</a:t>
             </a:fld>
             <a:endParaRPr lang="fr-FR"/>
           </a:p>
@@ -2098,7 +2104,7 @@
           <a:p>
             <a:fld id="{79049A12-6D64-4FC5-8C45-D8F5AEFED95C}" type="datetimeFigureOut">
               <a:rPr lang="fr-FR" smtClean="0"/>
-              <a:t>22/01/2022</a:t>
+              <a:t>25/01/2022</a:t>
             </a:fld>
             <a:endParaRPr lang="fr-FR"/>
           </a:p>
@@ -2351,7 +2357,7 @@
           <a:p>
             <a:fld id="{79049A12-6D64-4FC5-8C45-D8F5AEFED95C}" type="datetimeFigureOut">
               <a:rPr lang="fr-FR" smtClean="0"/>
-              <a:t>22/01/2022</a:t>
+              <a:t>25/01/2022</a:t>
             </a:fld>
             <a:endParaRPr lang="fr-FR"/>
           </a:p>
@@ -2564,7 +2570,7 @@
           <a:p>
             <a:fld id="{79049A12-6D64-4FC5-8C45-D8F5AEFED95C}" type="datetimeFigureOut">
               <a:rPr lang="fr-FR" smtClean="0"/>
-              <a:t>22/01/2022</a:t>
+              <a:t>25/01/2022</a:t>
             </a:fld>
             <a:endParaRPr lang="fr-FR"/>
           </a:p>
@@ -3469,7 +3475,7 @@
       </p:grpSpPr>
       <p:pic>
         <p:nvPicPr>
-          <p:cNvPr id="4" name="Image 3"/>
+          <p:cNvPr id="3" name="Image 2"/>
           <p:cNvPicPr>
             <a:picLocks noChangeAspect="1"/>
           </p:cNvPicPr>
@@ -3483,7 +3489,31 @@
         </p:blipFill>
         <p:spPr>
           <a:xfrm>
-            <a:off x="400376" y="3676599"/>
+            <a:off x="219303" y="2676700"/>
+            <a:ext cx="5944430" cy="3000794"/>
+          </a:xfrm>
+          <a:prstGeom prst="rect">
+            <a:avLst/>
+          </a:prstGeom>
+        </p:spPr>
+      </p:pic>
+      <p:pic>
+        <p:nvPicPr>
+          <p:cNvPr id="4" name="Image 3"/>
+          <p:cNvPicPr>
+            <a:picLocks noChangeAspect="1"/>
+          </p:cNvPicPr>
+          <p:nvPr/>
+        </p:nvPicPr>
+        <p:blipFill>
+          <a:blip r:embed="rId3"/>
+          <a:stretch>
+            <a:fillRect/>
+          </a:stretch>
+        </p:blipFill>
+        <p:spPr>
+          <a:xfrm>
+            <a:off x="384464" y="3170659"/>
             <a:ext cx="5052157" cy="1250697"/>
           </a:xfrm>
           <a:prstGeom prst="rect">
@@ -3506,7 +3536,7 @@
         </p:nvSpPr>
         <p:spPr>
           <a:xfrm>
-            <a:off x="0" y="0"/>
+            <a:off x="-135467" y="68161"/>
             <a:ext cx="12327467" cy="2009422"/>
           </a:xfrm>
           <a:prstGeom prst="rect">
@@ -3518,6 +3548,88 @@
               <a:lumOff val="25000"/>
             </a:schemeClr>
           </a:solidFill>
+        </p:spPr>
+        <p:style>
+          <a:lnRef idx="2">
+            <a:schemeClr val="accent1">
+              <a:shade val="50000"/>
+            </a:schemeClr>
+          </a:lnRef>
+          <a:fillRef idx="1">
+            <a:schemeClr val="accent1"/>
+          </a:fillRef>
+          <a:effectRef idx="0">
+            <a:schemeClr val="accent1"/>
+          </a:effectRef>
+          <a:fontRef idx="minor">
+            <a:schemeClr val="lt1"/>
+          </a:fontRef>
+        </p:style>
+        <p:txBody>
+          <a:bodyPr rtlCol="0" anchor="ctr"/>
+          <a:lstStyle/>
+          <a:p>
+            <a:pPr algn="ctr"/>
+            <a:r>
+              <a:rPr lang="fr-FR" sz="6000" dirty="0" smtClean="0">
+                <a:solidFill>
+                  <a:srgbClr val="CF384A"/>
+                </a:solidFill>
+              </a:rPr>
+              <a:t>Titre de la page de navigation</a:t>
+            </a:r>
+            <a:endParaRPr lang="fr-FR" sz="6000" dirty="0">
+              <a:solidFill>
+                <a:srgbClr val="CF384A"/>
+              </a:solidFill>
+            </a:endParaRPr>
+          </a:p>
+        </p:txBody>
+      </p:sp>
+      <p:pic>
+        <p:nvPicPr>
+          <p:cNvPr id="2" name="Image 1"/>
+          <p:cNvPicPr>
+            <a:picLocks noChangeAspect="1"/>
+          </p:cNvPicPr>
+          <p:nvPr/>
+        </p:nvPicPr>
+        <p:blipFill>
+          <a:blip r:embed="rId4"/>
+          <a:stretch>
+            <a:fillRect/>
+          </a:stretch>
+        </p:blipFill>
+        <p:spPr>
+          <a:xfrm>
+            <a:off x="1098597" y="5288924"/>
+            <a:ext cx="4509800" cy="1496340"/>
+          </a:xfrm>
+          <a:prstGeom prst="rect">
+            <a:avLst/>
+          </a:prstGeom>
+        </p:spPr>
+      </p:pic>
+      <p:sp>
+        <p:nvSpPr>
+          <p:cNvPr id="5" name="Ellipse 4"/>
+          <p:cNvSpPr/>
+          <p:nvPr/>
+        </p:nvSpPr>
+        <p:spPr>
+          <a:xfrm>
+            <a:off x="384464" y="4499264"/>
+            <a:ext cx="3647209" cy="633845"/>
+          </a:xfrm>
+          <a:prstGeom prst="ellipse">
+            <a:avLst/>
+          </a:prstGeom>
+          <a:noFill/>
+          <a:ln w="38100">
+            <a:solidFill>
+              <a:srgbClr val="FAC74E"/>
+            </a:solidFill>
+          </a:ln>
         </p:spPr>
         <p:style>
           <a:lnRef idx="2">
@@ -3732,6 +3844,234 @@
       </p:grpSpPr>
       <p:sp>
         <p:nvSpPr>
+          <p:cNvPr id="7" name="Rectangle à coins arrondis 6"/>
+          <p:cNvSpPr/>
+          <p:nvPr/>
+        </p:nvSpPr>
+        <p:spPr>
+          <a:xfrm>
+            <a:off x="571500" y="365125"/>
+            <a:ext cx="9892145" cy="1325563"/>
+          </a:xfrm>
+          <a:prstGeom prst="roundRect">
+            <a:avLst/>
+          </a:prstGeom>
+          <a:solidFill>
+            <a:srgbClr val="CF384A"/>
+          </a:solidFill>
+          <a:ln>
+            <a:solidFill>
+              <a:srgbClr val="FAC74E"/>
+            </a:solidFill>
+          </a:ln>
+        </p:spPr>
+        <p:style>
+          <a:lnRef idx="2">
+            <a:schemeClr val="accent1">
+              <a:shade val="50000"/>
+            </a:schemeClr>
+          </a:lnRef>
+          <a:fillRef idx="1">
+            <a:schemeClr val="accent1"/>
+          </a:fillRef>
+          <a:effectRef idx="0">
+            <a:schemeClr val="accent1"/>
+          </a:effectRef>
+          <a:fontRef idx="minor">
+            <a:schemeClr val="lt1"/>
+          </a:fontRef>
+        </p:style>
+        <p:txBody>
+          <a:bodyPr rtlCol="0" anchor="ctr"/>
+          <a:lstStyle/>
+          <a:p>
+            <a:pPr algn="ctr"/>
+            <a:endParaRPr lang="fr-FR"/>
+          </a:p>
+        </p:txBody>
+      </p:sp>
+      <p:sp>
+        <p:nvSpPr>
+          <p:cNvPr id="2" name="Titre 1"/>
+          <p:cNvSpPr>
+            <a:spLocks noGrp="1"/>
+          </p:cNvSpPr>
+          <p:nvPr>
+            <p:ph type="title"/>
+          </p:nvPr>
+        </p:nvSpPr>
+        <p:spPr/>
+        <p:txBody>
+          <a:bodyPr/>
+          <a:lstStyle/>
+          <a:p>
+            <a:r>
+              <a:rPr lang="fr-FR" dirty="0" smtClean="0">
+                <a:solidFill>
+                  <a:srgbClr val="FAC74E"/>
+                </a:solidFill>
+              </a:rPr>
+              <a:t>Balise </a:t>
+            </a:r>
+            <a:r>
+              <a:rPr lang="fr-FR" dirty="0" err="1" smtClean="0">
+                <a:solidFill>
+                  <a:srgbClr val="FAC74E"/>
+                </a:solidFill>
+              </a:rPr>
+              <a:t>meta</a:t>
+            </a:r>
+            <a:r>
+              <a:rPr lang="fr-FR" dirty="0" smtClean="0">
+                <a:solidFill>
+                  <a:srgbClr val="FAC74E"/>
+                </a:solidFill>
+              </a:rPr>
+              <a:t> pour améliorer le classement </a:t>
+            </a:r>
+            <a:br>
+              <a:rPr lang="fr-FR" dirty="0" smtClean="0">
+                <a:solidFill>
+                  <a:srgbClr val="FAC74E"/>
+                </a:solidFill>
+              </a:rPr>
+            </a:br>
+            <a:r>
+              <a:rPr lang="fr-FR" dirty="0" smtClean="0">
+                <a:solidFill>
+                  <a:srgbClr val="FAC74E"/>
+                </a:solidFill>
+              </a:rPr>
+              <a:t>naturel SEO</a:t>
+            </a:r>
+            <a:endParaRPr lang="fr-FR" dirty="0">
+              <a:solidFill>
+                <a:srgbClr val="FAC74E"/>
+              </a:solidFill>
+            </a:endParaRPr>
+          </a:p>
+        </p:txBody>
+      </p:sp>
+      <p:pic>
+        <p:nvPicPr>
+          <p:cNvPr id="4" name="Espace réservé du contenu 3"/>
+          <p:cNvPicPr>
+            <a:picLocks noGrp="1" noChangeAspect="1"/>
+          </p:cNvPicPr>
+          <p:nvPr>
+            <p:ph idx="1"/>
+          </p:nvPr>
+        </p:nvPicPr>
+        <p:blipFill>
+          <a:blip r:embed="rId2"/>
+          <a:stretch>
+            <a:fillRect/>
+          </a:stretch>
+        </p:blipFill>
+        <p:spPr>
+          <a:xfrm>
+            <a:off x="1365997" y="1825625"/>
+            <a:ext cx="4027978" cy="1852757"/>
+          </a:xfrm>
+          <a:prstGeom prst="rect">
+            <a:avLst/>
+          </a:prstGeom>
+        </p:spPr>
+      </p:pic>
+      <p:pic>
+        <p:nvPicPr>
+          <p:cNvPr id="8" name="Image 7"/>
+          <p:cNvPicPr>
+            <a:picLocks noChangeAspect="1"/>
+          </p:cNvPicPr>
+          <p:nvPr/>
+        </p:nvPicPr>
+        <p:blipFill>
+          <a:blip r:embed="rId3"/>
+          <a:stretch>
+            <a:fillRect/>
+          </a:stretch>
+        </p:blipFill>
+        <p:spPr>
+          <a:xfrm>
+            <a:off x="146808" y="3813320"/>
+            <a:ext cx="7313866" cy="1692320"/>
+          </a:xfrm>
+          <a:prstGeom prst="rect">
+            <a:avLst/>
+          </a:prstGeom>
+        </p:spPr>
+      </p:pic>
+      <p:pic>
+        <p:nvPicPr>
+          <p:cNvPr id="5" name="Image 4"/>
+          <p:cNvPicPr>
+            <a:picLocks noChangeAspect="1"/>
+          </p:cNvPicPr>
+          <p:nvPr/>
+        </p:nvPicPr>
+        <p:blipFill>
+          <a:blip r:embed="rId4"/>
+          <a:stretch>
+            <a:fillRect/>
+          </a:stretch>
+        </p:blipFill>
+        <p:spPr>
+          <a:xfrm>
+            <a:off x="733404" y="4227414"/>
+            <a:ext cx="6506483" cy="647790"/>
+          </a:xfrm>
+          <a:prstGeom prst="rect">
+            <a:avLst/>
+          </a:prstGeom>
+          <a:ln w="38100" cap="sq">
+            <a:solidFill>
+              <a:srgbClr val="000000"/>
+            </a:solidFill>
+            <a:prstDash val="solid"/>
+            <a:miter lim="800000"/>
+          </a:ln>
+          <a:effectLst>
+            <a:outerShdw blurRad="50800" dist="38100" dir="2700000" algn="tl" rotWithShape="0">
+              <a:srgbClr val="000000">
+                <a:alpha val="43000"/>
+              </a:srgbClr>
+            </a:outerShdw>
+          </a:effectLst>
+        </p:spPr>
+      </p:pic>
+    </p:spTree>
+    <p:extLst>
+      <p:ext uri="{BB962C8B-B14F-4D97-AF65-F5344CB8AC3E}">
+        <p14:creationId xmlns:p14="http://schemas.microsoft.com/office/powerpoint/2010/main" val="3726480442"/>
+      </p:ext>
+    </p:extLst>
+  </p:cSld>
+  <p:clrMapOvr>
+    <a:masterClrMapping/>
+  </p:clrMapOvr>
+</p:sld>
+</file>
+
+<file path=ppt/slides/slide6.xml><?xml version="1.0" encoding="utf-8"?>
+<p:sld xmlns:a="http://schemas.openxmlformats.org/drawingml/2006/main" xmlns:r="http://schemas.openxmlformats.org/officeDocument/2006/relationships" xmlns:p="http://schemas.openxmlformats.org/presentationml/2006/main">
+  <p:cSld>
+    <p:spTree>
+      <p:nvGrpSpPr>
+        <p:cNvPr id="1" name=""/>
+        <p:cNvGrpSpPr/>
+        <p:nvPr/>
+      </p:nvGrpSpPr>
+      <p:grpSpPr>
+        <a:xfrm>
+          <a:off x="0" y="0"/>
+          <a:ext cx="0" cy="0"/>
+          <a:chOff x="0" y="0"/>
+          <a:chExt cx="0" cy="0"/>
+        </a:xfrm>
+      </p:grpSpPr>
+      <p:sp>
+        <p:nvSpPr>
           <p:cNvPr id="8" name="Rectangle 7"/>
           <p:cNvSpPr/>
           <p:nvPr/>
@@ -3991,7 +4331,7 @@
 </p:sld>
 </file>
 
-<file path=ppt/slides/slide6.xml><?xml version="1.0" encoding="utf-8"?>
+<file path=ppt/slides/slide7.xml><?xml version="1.0" encoding="utf-8"?>
 <p:sld xmlns:a="http://schemas.openxmlformats.org/drawingml/2006/main" xmlns:r="http://schemas.openxmlformats.org/officeDocument/2006/relationships" xmlns:p="http://schemas.openxmlformats.org/presentationml/2006/main">
   <p:cSld>
     <p:bg>

</xml_diff>